<commit_message>
edit fri 2/24 slides
</commit_message>
<xml_diff>
--- a/spring12/slidesS12/ordinary-vs-strong-induction.pptx
+++ b/spring12/slidesS12/ordinary-vs-strong-induction.pptx
@@ -206,7 +206,7 @@
             <a:fld id="{D875CB5D-1501-4E8C-8449-8F562B53033D}" type="datetimeFigureOut">
               <a:rPr lang="en-US" smtClean="0"/>
               <a:pPr/>
-              <a:t>2/20/12</a:t>
+              <a:t>2/21/12</a:t>
             </a:fld>
             <a:endParaRPr lang="en-US"/>
           </a:p>
@@ -373,7 +373,7 @@
             <a:fld id="{2E64E5CB-D4EF-403A-9BB6-139C52688DF7}" type="datetimeFigureOut">
               <a:rPr lang="en-US" smtClean="0"/>
               <a:pPr/>
-              <a:t>2/20/12</a:t>
+              <a:t>2/21/12</a:t>
             </a:fld>
             <a:endParaRPr lang="en-US"/>
           </a:p>
@@ -2240,28 +2240,28 @@
           <a:bodyPr/>
           <a:lstStyle/>
           <a:p>
-            <a:pPr algn="l" eaLnBrk="1" hangingPunct="1"/>
-            <a:r>
-              <a:rPr lang="en-US" sz="6600" dirty="0" smtClean="0"/>
+            <a:pPr eaLnBrk="1" hangingPunct="1"/>
+            <a:r>
+              <a:rPr lang="en-US" sz="6600" b="0" dirty="0" smtClean="0"/>
               <a:t>Ordinary Induction </a:t>
             </a:r>
             <a:r>
-              <a:rPr lang="en-US" sz="6600" dirty="0" err="1" smtClean="0"/>
+              <a:rPr lang="en-US" sz="6600" b="0" dirty="0" err="1" smtClean="0"/>
               <a:t>vs</a:t>
             </a:r>
             <a:r>
-              <a:rPr lang="en-US" sz="6600" dirty="0" smtClean="0"/>
+              <a:rPr lang="en-US" sz="6600" b="0" dirty="0" smtClean="0"/>
               <a:t> Strong Induction </a:t>
             </a:r>
             <a:r>
-              <a:rPr lang="en-US" sz="6600" dirty="0" err="1" smtClean="0"/>
+              <a:rPr lang="en-US" sz="6600" b="0" dirty="0" err="1" smtClean="0"/>
               <a:t>vs</a:t>
             </a:r>
             <a:r>
-              <a:rPr lang="en-US" sz="6600" dirty="0" smtClean="0"/>
+              <a:rPr lang="en-US" sz="6600" b="0" dirty="0" smtClean="0"/>
               <a:t> WOP</a:t>
             </a:r>
-            <a:endParaRPr lang="en-US" sz="6600" baseline="-25000" dirty="0" smtClean="0"/>
+            <a:endParaRPr lang="en-US" sz="6600" b="0" baseline="-25000" dirty="0" smtClean="0"/>
           </a:p>
         </p:txBody>
       </p:sp>
@@ -2439,6 +2439,9 @@
   <p:clrMapOvr>
     <a:masterClrMapping/>
   </p:clrMapOvr>
+  <p:transition xmlns:p14="http://schemas.microsoft.com/office/powerpoint/2010/main" spd="slow">
+    <p:fade thruBlk="1"/>
+  </p:transition>
   <p:timing>
     <p:tnLst>
       <p:par>
@@ -3292,7 +3295,7 @@
               <a:t> </a:t>
             </a:r>
             <a:r>
-              <a:rPr lang="en-US" sz="5400" dirty="0" smtClean="0">
+              <a:rPr lang="en-US" sz="6000" dirty="0" smtClean="0">
                 <a:solidFill>
                   <a:srgbClr val="0000FF"/>
                 </a:solidFill>
@@ -3300,7 +3303,7 @@
               <a:t>P(</a:t>
             </a:r>
             <a:r>
-              <a:rPr lang="en-US" sz="5400" dirty="0" smtClean="0">
+              <a:rPr lang="en-US" sz="6000" dirty="0" smtClean="0">
                 <a:solidFill>
                   <a:srgbClr val="008000"/>
                 </a:solidFill>
@@ -3308,7 +3311,7 @@
               <a:t>n+1</a:t>
             </a:r>
             <a:r>
-              <a:rPr lang="en-US" sz="5400" dirty="0" smtClean="0">
+              <a:rPr lang="en-US" sz="6000" dirty="0" smtClean="0">
                 <a:solidFill>
                   <a:srgbClr val="0000FF"/>
                 </a:solidFill>
@@ -3345,7 +3348,7 @@
           <a:graphicData uri="http://schemas.openxmlformats.org/presentationml/2006/ole">
             <mc:AlternateContent xmlns:mc="http://schemas.openxmlformats.org/markup-compatibility/2006">
               <mc:Choice xmlns:v="urn:schemas-microsoft-com:vml" Requires="v">
-                <p:oleObj spid="_x0000_s417804" name="Equation" r:id="rId3" imgW="622300" imgH="228600" progId="Equation.DSMT4">
+                <p:oleObj spid="_x0000_s417814" name="Equation" r:id="rId3" imgW="622300" imgH="228600" progId="Equation.DSMT4">
                   <p:embed/>
                 </p:oleObj>
               </mc:Choice>
@@ -3380,63 +3383,6 @@
           </a:graphicData>
         </a:graphic>
       </p:graphicFrame>
-      <p:graphicFrame>
-        <p:nvGraphicFramePr>
-          <p:cNvPr id="6" name="Object 5"/>
-          <p:cNvGraphicFramePr>
-            <a:graphicFrameLocks noChangeAspect="1"/>
-          </p:cNvGraphicFramePr>
-          <p:nvPr>
-            <p:extLst>
-              <p:ext uri="{D42A27DB-BD31-4B8C-83A1-F6EECF244321}">
-                <p14:modId xmlns:p14="http://schemas.microsoft.com/office/powerpoint/2010/main" val="1386087726"/>
-              </p:ext>
-            </p:extLst>
-          </p:nvPr>
-        </p:nvGraphicFramePr>
-        <p:xfrm>
-          <a:off x="2571750" y="3810000"/>
-          <a:ext cx="4000500" cy="1143000"/>
-        </p:xfrm>
-        <a:graphic>
-          <a:graphicData uri="http://schemas.openxmlformats.org/presentationml/2006/ole">
-            <mc:AlternateContent xmlns:mc="http://schemas.openxmlformats.org/markup-compatibility/2006">
-              <mc:Choice xmlns:v="urn:schemas-microsoft-com:vml" Requires="v">
-                <p:oleObj spid="_x0000_s417805" name="Equation" r:id="rId5" imgW="800100" imgH="228600" progId="Equation.DSMT4">
-                  <p:embed/>
-                </p:oleObj>
-              </mc:Choice>
-              <mc:Fallback>
-                <p:oleObj name="Equation" r:id="rId5" imgW="800100" imgH="228600" progId="Equation.DSMT4">
-                  <p:embed/>
-                  <p:pic>
-                    <p:nvPicPr>
-                      <p:cNvPr id="0" name=""/>
-                      <p:cNvPicPr/>
-                      <p:nvPr/>
-                    </p:nvPicPr>
-                    <p:blipFill>
-                      <a:blip r:embed="rId6"/>
-                      <a:stretch>
-                        <a:fillRect/>
-                      </a:stretch>
-                    </p:blipFill>
-                    <p:spPr>
-                      <a:xfrm>
-                        <a:off x="2571750" y="3810000"/>
-                        <a:ext cx="4000500" cy="1143000"/>
-                      </a:xfrm>
-                      <a:prstGeom prst="rect">
-                        <a:avLst/>
-                      </a:prstGeom>
-                    </p:spPr>
-                  </p:pic>
-                </p:oleObj>
-              </mc:Fallback>
-            </mc:AlternateContent>
-          </a:graphicData>
-        </a:graphic>
-      </p:graphicFrame>
       <p:sp>
         <p:nvSpPr>
           <p:cNvPr id="8" name="Title 1"/>
@@ -3467,6 +3413,63 @@
           </a:p>
         </p:txBody>
       </p:sp>
+      <p:graphicFrame>
+        <p:nvGraphicFramePr>
+          <p:cNvPr id="2" name="Object 1"/>
+          <p:cNvGraphicFramePr>
+            <a:graphicFrameLocks noChangeAspect="1"/>
+          </p:cNvGraphicFramePr>
+          <p:nvPr>
+            <p:extLst>
+              <p:ext uri="{D42A27DB-BD31-4B8C-83A1-F6EECF244321}">
+                <p14:modId xmlns:p14="http://schemas.microsoft.com/office/powerpoint/2010/main" val="2463255758"/>
+              </p:ext>
+            </p:extLst>
+          </p:nvPr>
+        </p:nvGraphicFramePr>
+        <p:xfrm>
+          <a:off x="2247900" y="3810000"/>
+          <a:ext cx="4000498" cy="1143000"/>
+        </p:xfrm>
+        <a:graphic>
+          <a:graphicData uri="http://schemas.openxmlformats.org/presentationml/2006/ole">
+            <mc:AlternateContent xmlns:mc="http://schemas.openxmlformats.org/markup-compatibility/2006">
+              <mc:Choice xmlns:v="urn:schemas-microsoft-com:vml" Requires="v">
+                <p:oleObj spid="_x0000_s417815" name="Equation" r:id="rId5" imgW="800100" imgH="228600" progId="Equation.DSMT4">
+                  <p:embed/>
+                </p:oleObj>
+              </mc:Choice>
+              <mc:Fallback>
+                <p:oleObj name="Equation" r:id="rId5" imgW="800100" imgH="228600" progId="Equation.DSMT4">
+                  <p:embed/>
+                  <p:pic>
+                    <p:nvPicPr>
+                      <p:cNvPr id="0" name=""/>
+                      <p:cNvPicPr/>
+                      <p:nvPr/>
+                    </p:nvPicPr>
+                    <p:blipFill>
+                      <a:blip r:embed="rId6"/>
+                      <a:stretch>
+                        <a:fillRect/>
+                      </a:stretch>
+                    </p:blipFill>
+                    <p:spPr>
+                      <a:xfrm>
+                        <a:off x="2247900" y="3810000"/>
+                        <a:ext cx="4000498" cy="1143000"/>
+                      </a:xfrm>
+                      <a:prstGeom prst="rect">
+                        <a:avLst/>
+                      </a:prstGeom>
+                    </p:spPr>
+                  </p:pic>
+                </p:oleObj>
+              </mc:Fallback>
+            </mc:AlternateContent>
+          </a:graphicData>
+        </a:graphic>
+      </p:graphicFrame>
     </p:spTree>
     <p:extLst>
       <p:ext uri="{BB962C8B-B14F-4D97-AF65-F5344CB8AC3E}">
@@ -3477,6 +3480,9 @@
   <p:clrMapOvr>
     <a:masterClrMapping/>
   </p:clrMapOvr>
+  <p:transition xmlns:p14="http://schemas.microsoft.com/office/powerpoint/2010/main" spd="slow">
+    <p:fade thruBlk="1"/>
+  </p:transition>
   <p:timing>
     <p:tnLst>
       <p:par>
@@ -3679,21 +3685,39 @@
                                   </p:childTnLst>
                                 </p:cTn>
                               </p:par>
+                            </p:childTnLst>
+                          </p:cTn>
+                        </p:par>
+                      </p:childTnLst>
+                    </p:cTn>
+                  </p:par>
+                  <p:par>
+                    <p:cTn id="19" fill="hold">
+                      <p:stCondLst>
+                        <p:cond delay="indefinite"/>
+                      </p:stCondLst>
+                      <p:childTnLst>
+                        <p:par>
+                          <p:cTn id="20" fill="hold">
+                            <p:stCondLst>
+                              <p:cond delay="0"/>
+                            </p:stCondLst>
+                            <p:childTnLst>
                               <p:par>
-                                <p:cTn id="19" presetID="9" presetClass="entr" presetSubtype="0" fill="hold" nodeType="withEffect">
+                                <p:cTn id="21" presetID="22" presetClass="entr" presetSubtype="8" fill="hold" nodeType="clickEffect">
                                   <p:stCondLst>
                                     <p:cond delay="0"/>
                                   </p:stCondLst>
                                   <p:childTnLst>
                                     <p:set>
                                       <p:cBhvr>
-                                        <p:cTn id="20" dur="1" fill="hold">
+                                        <p:cTn id="22" dur="1" fill="hold">
                                           <p:stCondLst>
                                             <p:cond delay="0"/>
                                           </p:stCondLst>
                                         </p:cTn>
                                         <p:tgtEl>
-                                          <p:spTgt spid="6"/>
+                                          <p:spTgt spid="2"/>
                                         </p:tgtEl>
                                         <p:attrNameLst>
                                           <p:attrName>style.visibility</p:attrName>
@@ -3703,11 +3727,11 @@
                                         <p:strVal val="visible"/>
                                       </p:to>
                                     </p:set>
-                                    <p:animEffect transition="in" filter="dissolve">
+                                    <p:animEffect transition="in" filter="wipe(left)">
                                       <p:cBhvr>
-                                        <p:cTn id="21" dur="500"/>
+                                        <p:cTn id="23" dur="1000"/>
                                         <p:tgtEl>
-                                          <p:spTgt spid="6"/>
+                                          <p:spTgt spid="2"/>
                                         </p:tgtEl>
                                       </p:cBhvr>
                                     </p:animEffect>
@@ -3721,26 +3745,26 @@
                     </p:cTn>
                   </p:par>
                   <p:par>
-                    <p:cTn id="22" fill="hold">
+                    <p:cTn id="24" fill="hold">
                       <p:stCondLst>
                         <p:cond delay="indefinite"/>
                       </p:stCondLst>
                       <p:childTnLst>
                         <p:par>
-                          <p:cTn id="23" fill="hold">
+                          <p:cTn id="25" fill="hold">
                             <p:stCondLst>
                               <p:cond delay="0"/>
                             </p:stCondLst>
                             <p:childTnLst>
                               <p:par>
-                                <p:cTn id="24" presetID="9" presetClass="entr" presetSubtype="0" fill="hold" grpId="0" nodeType="clickEffect">
+                                <p:cTn id="26" presetID="9" presetClass="entr" presetSubtype="0" fill="hold" grpId="0" nodeType="clickEffect">
                                   <p:stCondLst>
                                     <p:cond delay="0"/>
                                   </p:stCondLst>
                                   <p:childTnLst>
                                     <p:set>
                                       <p:cBhvr>
-                                        <p:cTn id="25" dur="1" fill="hold">
+                                        <p:cTn id="27" dur="1" fill="hold">
                                           <p:stCondLst>
                                             <p:cond delay="0"/>
                                           </p:stCondLst>
@@ -3762,7 +3786,7 @@
                                     </p:set>
                                     <p:animEffect transition="in" filter="dissolve">
                                       <p:cBhvr>
-                                        <p:cTn id="26" dur="500"/>
+                                        <p:cTn id="28" dur="500"/>
                                         <p:tgtEl>
                                           <p:spTgt spid="3">
                                             <p:txEl>
@@ -3880,63 +3904,6 @@
           </a:p>
         </p:txBody>
       </p:sp>
-      <p:graphicFrame>
-        <p:nvGraphicFramePr>
-          <p:cNvPr id="2" name="Object 1"/>
-          <p:cNvGraphicFramePr>
-            <a:graphicFrameLocks noChangeAspect="1"/>
-          </p:cNvGraphicFramePr>
-          <p:nvPr>
-            <p:extLst>
-              <p:ext uri="{D42A27DB-BD31-4B8C-83A1-F6EECF244321}">
-                <p14:modId xmlns:p14="http://schemas.microsoft.com/office/powerpoint/2010/main" val="796365862"/>
-              </p:ext>
-            </p:extLst>
-          </p:nvPr>
-        </p:nvGraphicFramePr>
-        <p:xfrm>
-          <a:off x="762000" y="2362200"/>
-          <a:ext cx="7761288" cy="1258888"/>
-        </p:xfrm>
-        <a:graphic>
-          <a:graphicData uri="http://schemas.openxmlformats.org/presentationml/2006/ole">
-            <mc:AlternateContent xmlns:mc="http://schemas.openxmlformats.org/markup-compatibility/2006">
-              <mc:Choice xmlns:v="urn:schemas-microsoft-com:vml" Requires="v">
-                <p:oleObj spid="_x0000_s1031" name="Equation" r:id="rId4" imgW="1409700" imgH="228600" progId="Equation.DSMT4">
-                  <p:embed/>
-                </p:oleObj>
-              </mc:Choice>
-              <mc:Fallback>
-                <p:oleObj name="Equation" r:id="rId4" imgW="1409700" imgH="228600" progId="Equation.DSMT4">
-                  <p:embed/>
-                  <p:pic>
-                    <p:nvPicPr>
-                      <p:cNvPr id="0" name=""/>
-                      <p:cNvPicPr/>
-                      <p:nvPr/>
-                    </p:nvPicPr>
-                    <p:blipFill>
-                      <a:blip r:embed="rId5"/>
-                      <a:stretch>
-                        <a:fillRect/>
-                      </a:stretch>
-                    </p:blipFill>
-                    <p:spPr>
-                      <a:xfrm>
-                        <a:off x="762000" y="2362200"/>
-                        <a:ext cx="7761288" cy="1258888"/>
-                      </a:xfrm>
-                      <a:prstGeom prst="rect">
-                        <a:avLst/>
-                      </a:prstGeom>
-                    </p:spPr>
-                  </p:pic>
-                </p:oleObj>
-              </mc:Fallback>
-            </mc:AlternateContent>
-          </a:graphicData>
-        </a:graphic>
-      </p:graphicFrame>
       <p:sp>
         <p:nvSpPr>
           <p:cNvPr id="3" name="TextBox 2"/>
@@ -3945,8 +3912,8 @@
         </p:nvSpPr>
         <p:spPr>
           <a:xfrm>
-            <a:off x="209117" y="3886200"/>
-            <a:ext cx="8725766" cy="1569660"/>
+            <a:off x="457200" y="3657600"/>
+            <a:ext cx="8290626" cy="1754327"/>
           </a:xfrm>
           <a:prstGeom prst="rect">
             <a:avLst/>
@@ -3963,10 +3930,16 @@
               <a:rPr lang="en-US" sz="4800" dirty="0" smtClean="0">
                 <a:latin typeface="Comic Sans MS" pitchFamily="66" charset="0"/>
               </a:rPr>
-              <a:t>Now </a:t>
-            </a:r>
-            <a:r>
-              <a:rPr lang="en-US" sz="4800" dirty="0" smtClean="0">
+              <a:t>N</a:t>
+            </a:r>
+            <a:r>
+              <a:rPr lang="en-US" sz="5400" dirty="0" smtClean="0">
+                <a:latin typeface="Comic Sans MS" pitchFamily="66" charset="0"/>
+              </a:rPr>
+              <a:t>ow </a:t>
+            </a:r>
+            <a:r>
+              <a:rPr lang="en-US" sz="5400" dirty="0" smtClean="0">
                 <a:solidFill>
                   <a:srgbClr val="BC34CA"/>
                 </a:solidFill>
@@ -3975,22 +3948,34 @@
               <a:t>same proof</a:t>
             </a:r>
             <a:r>
-              <a:rPr lang="en-US" sz="4800" dirty="0" smtClean="0">
+              <a:rPr lang="en-US" sz="5400" dirty="0" smtClean="0">
                 <a:latin typeface="Comic Sans MS" pitchFamily="66" charset="0"/>
               </a:rPr>
-              <a:t> goes through</a:t>
-            </a:r>
-          </a:p>
-          <a:p>
-            <a:r>
-              <a:rPr lang="en-US" sz="4800" dirty="0" smtClean="0">
+              <a:t> </a:t>
+            </a:r>
+            <a:r>
+              <a:rPr lang="en-US" sz="5400" dirty="0" smtClean="0">
                 <a:latin typeface="Comic Sans MS" pitchFamily="66" charset="0"/>
               </a:rPr>
-              <a:t>by Ordinary Induction.</a:t>
-            </a:r>
-            <a:endParaRPr lang="en-US" sz="4800" dirty="0" smtClean="0">
+              <a:t>becomes</a:t>
+            </a:r>
+            <a:endParaRPr lang="en-US" sz="5400" dirty="0" smtClean="0">
               <a:latin typeface="Comic Sans MS" pitchFamily="66" charset="0"/>
             </a:endParaRPr>
+          </a:p>
+          <a:p>
+            <a:r>
+              <a:rPr lang="en-US" sz="5400" dirty="0" smtClean="0">
+                <a:latin typeface="Comic Sans MS" pitchFamily="66" charset="0"/>
+              </a:rPr>
+              <a:t>Ordinary </a:t>
+            </a:r>
+            <a:r>
+              <a:rPr lang="en-US" sz="5400" dirty="0" smtClean="0">
+                <a:latin typeface="Comic Sans MS" pitchFamily="66" charset="0"/>
+              </a:rPr>
+              <a:t>Induction.</a:t>
+            </a:r>
           </a:p>
         </p:txBody>
       </p:sp>
@@ -4040,6 +4025,63 @@
           </a:p>
         </p:txBody>
       </p:sp>
+      <p:graphicFrame>
+        <p:nvGraphicFramePr>
+          <p:cNvPr id="4" name="Object 3"/>
+          <p:cNvGraphicFramePr>
+            <a:graphicFrameLocks noChangeAspect="1"/>
+          </p:cNvGraphicFramePr>
+          <p:nvPr>
+            <p:extLst>
+              <p:ext uri="{D42A27DB-BD31-4B8C-83A1-F6EECF244321}">
+                <p14:modId xmlns:p14="http://schemas.microsoft.com/office/powerpoint/2010/main" val="3623205941"/>
+              </p:ext>
+            </p:extLst>
+          </p:nvPr>
+        </p:nvGraphicFramePr>
+        <p:xfrm>
+          <a:off x="469900" y="2362200"/>
+          <a:ext cx="7988300" cy="1295400"/>
+        </p:xfrm>
+        <a:graphic>
+          <a:graphicData uri="http://schemas.openxmlformats.org/presentationml/2006/ole">
+            <mc:AlternateContent xmlns:mc="http://schemas.openxmlformats.org/markup-compatibility/2006">
+              <mc:Choice xmlns:v="urn:schemas-microsoft-com:vml" Requires="v">
+                <p:oleObj spid="_x0000_s1037" name="Equation" r:id="rId4" imgW="1409700" imgH="228600" progId="Equation.DSMT4">
+                  <p:embed/>
+                </p:oleObj>
+              </mc:Choice>
+              <mc:Fallback>
+                <p:oleObj name="Equation" r:id="rId4" imgW="1409700" imgH="228600" progId="Equation.DSMT4">
+                  <p:embed/>
+                  <p:pic>
+                    <p:nvPicPr>
+                      <p:cNvPr id="0" name=""/>
+                      <p:cNvPicPr/>
+                      <p:nvPr/>
+                    </p:nvPicPr>
+                    <p:blipFill>
+                      <a:blip r:embed="rId5"/>
+                      <a:stretch>
+                        <a:fillRect/>
+                      </a:stretch>
+                    </p:blipFill>
+                    <p:spPr>
+                      <a:xfrm>
+                        <a:off x="469900" y="2362200"/>
+                        <a:ext cx="7988300" cy="1295400"/>
+                      </a:xfrm>
+                      <a:prstGeom prst="rect">
+                        <a:avLst/>
+                      </a:prstGeom>
+                    </p:spPr>
+                  </p:pic>
+                </p:oleObj>
+              </mc:Fallback>
+            </mc:AlternateContent>
+          </a:graphicData>
+        </a:graphic>
+      </p:graphicFrame>
     </p:spTree>
     <p:extLst>
       <p:ext uri="{BB962C8B-B14F-4D97-AF65-F5344CB8AC3E}">
@@ -4050,6 +4092,18 @@
   <p:clrMapOvr>
     <a:masterClrMapping/>
   </p:clrMapOvr>
+  <mc:AlternateContent xmlns:mc="http://schemas.openxmlformats.org/markup-compatibility/2006">
+    <mc:Choice xmlns:p14="http://schemas.microsoft.com/office/powerpoint/2010/main" Requires="p14">
+      <p:transition spd="med" p14:dur="700">
+        <p:fade/>
+      </p:transition>
+    </mc:Choice>
+    <mc:Fallback>
+      <p:transition xmlns:p14="http://schemas.microsoft.com/office/powerpoint/2010/main" spd="med">
+        <p:fade/>
+      </p:transition>
+    </mc:Fallback>
+  </mc:AlternateContent>
   <p:timing>
     <p:tnLst>
       <p:par>
@@ -4062,6 +4116,9 @@
                     <p:cTn id="3" fill="hold">
                       <p:stCondLst>
                         <p:cond delay="indefinite"/>
+                        <p:cond evt="onBegin" delay="0">
+                          <p:tn val="2"/>
+                        </p:cond>
                       </p:stCondLst>
                       <p:childTnLst>
                         <p:par>
@@ -4071,7 +4128,7 @@
                             </p:stCondLst>
                             <p:childTnLst>
                               <p:par>
-                                <p:cTn id="5" presetID="22" presetClass="entr" presetSubtype="8" fill="hold" nodeType="clickEffect">
+                                <p:cTn id="5" presetID="22" presetClass="entr" presetSubtype="8" fill="hold" nodeType="afterEffect">
                                   <p:stCondLst>
                                     <p:cond delay="0"/>
                                   </p:stCondLst>
@@ -4084,7 +4141,7 @@
                                           </p:stCondLst>
                                         </p:cTn>
                                         <p:tgtEl>
-                                          <p:spTgt spid="2"/>
+                                          <p:spTgt spid="4"/>
                                         </p:tgtEl>
                                         <p:attrNameLst>
                                           <p:attrName>style.visibility</p:attrName>
@@ -4098,7 +4155,7 @@
                                       <p:cBhvr>
                                         <p:cTn id="7" dur="500"/>
                                         <p:tgtEl>
-                                          <p:spTgt spid="2"/>
+                                          <p:spTgt spid="4"/>
                                         </p:tgtEl>
                                       </p:cBhvr>
                                     </p:animEffect>
@@ -4261,7 +4318,15 @@
           <a:p>
             <a:r>
               <a:rPr lang="en-US" sz="4800" dirty="0" smtClean="0"/>
-              <a:t>So Strong Induction add no power.  Just decorate a Strong proof </a:t>
+              <a:t>So Strong </a:t>
+            </a:r>
+            <a:r>
+              <a:rPr lang="en-US" sz="4800" smtClean="0"/>
+              <a:t>Induction adds </a:t>
+            </a:r>
+            <a:r>
+              <a:rPr lang="en-US" sz="4800" dirty="0" smtClean="0"/>
+              <a:t>no power.  Just decorate a Strong proof </a:t>
             </a:r>
             <a:r>
               <a:rPr lang="en-US" sz="4800" dirty="0"/>
@@ -4302,6 +4367,18 @@
   <p:clrMapOvr>
     <a:masterClrMapping/>
   </p:clrMapOvr>
+  <mc:AlternateContent xmlns:mc="http://schemas.openxmlformats.org/markup-compatibility/2006">
+    <mc:Choice xmlns:p14="http://schemas.microsoft.com/office/powerpoint/2010/main" Requires="p14">
+      <p:transition spd="med" p14:dur="700">
+        <p:fade/>
+      </p:transition>
+    </mc:Choice>
+    <mc:Fallback>
+      <p:transition xmlns:p14="http://schemas.microsoft.com/office/powerpoint/2010/main" spd="med">
+        <p:fade/>
+      </p:transition>
+    </mc:Fallback>
+  </mc:AlternateContent>
   <p:timing>
     <p:tnLst>
       <p:par>
@@ -4487,9 +4564,6 @@
               </a:rPr>
               <a:t>.</a:t>
             </a:r>
-            <a:endParaRPr lang="en-US" sz="6000" dirty="0" smtClean="0">
-              <a:latin typeface="Comic Sans MS" pitchFamily="66" charset="0"/>
-            </a:endParaRPr>
           </a:p>
         </p:txBody>
       </p:sp>
@@ -4515,7 +4589,7 @@
           <a:graphicData uri="http://schemas.openxmlformats.org/presentationml/2006/ole">
             <mc:AlternateContent xmlns:mc="http://schemas.openxmlformats.org/markup-compatibility/2006">
               <mc:Choice xmlns:v="urn:schemas-microsoft-com:vml" Requires="v">
-                <p:oleObj spid="_x0000_s418819" name="Equation" r:id="rId4" imgW="508000" imgH="190500" progId="Equation.DSMT4">
+                <p:oleObj spid="_x0000_s418825" name="Equation" r:id="rId4" imgW="508000" imgH="190500" progId="Equation.DSMT4">
                   <p:embed/>
                 </p:oleObj>
               </mc:Choice>
@@ -4560,6 +4634,9 @@
   <p:clrMapOvr>
     <a:masterClrMapping/>
   </p:clrMapOvr>
+  <p:transition xmlns:p14="http://schemas.microsoft.com/office/powerpoint/2010/main" spd="slow">
+    <p:fade thruBlk="1"/>
+  </p:transition>
   <p:timing>
     <p:tnLst>
       <p:par>
@@ -4949,9 +5026,6 @@
               </a:rPr>
               <a:t>principle.</a:t>
             </a:r>
-            <a:endParaRPr lang="en-US" sz="4400" dirty="0" smtClean="0">
-              <a:latin typeface="Comic Sans MS" pitchFamily="66" charset="0"/>
-            </a:endParaRPr>
           </a:p>
         </p:txBody>
       </p:sp>
@@ -5040,6 +5114,9 @@
   <p:clrMapOvr>
     <a:masterClrMapping/>
   </p:clrMapOvr>
+  <p:transition xmlns:p14="http://schemas.microsoft.com/office/powerpoint/2010/main" spd="slow">
+    <p:fade thruBlk="1"/>
+  </p:transition>
   <p:timing>
     <p:tnLst>
       <p:par>

</xml_diff>